<commit_message>
Updating the planning presentation as per the feedback.
</commit_message>
<xml_diff>
--- a/PlanningPresentation.pptx
+++ b/PlanningPresentation.pptx
@@ -113,7 +113,16 @@
       </a:defRPr>
     </a:lvl9pPr>
   </p:defaultTextStyle>
+  <p:extLst>
+    <p:ext uri="{EFAFB233-063F-42B5-8137-9DF3F51BA10A}">
+      <p15:sldGuideLst xmlns:p15="http://schemas.microsoft.com/office/powerpoint/2012/main"/>
+    </p:ext>
+  </p:extLst>
 </p:presentation>
+</file>
+
+<file path=ppt/revisionInfo.xml><?xml version="1.0" encoding="utf-8"?>
+<p1510:revInfo xmlns:a="http://schemas.openxmlformats.org/drawingml/2006/main" xmlns:r="http://schemas.openxmlformats.org/officeDocument/2006/relationships" xmlns:p1510="http://schemas.microsoft.com/office/powerpoint/2015/10/main"/>
 </file>
 
 <file path=ppt/diagrams/colors1.xml><?xml version="1.0" encoding="utf-8"?>
@@ -3775,7 +3784,7 @@
             <a:fld id="{B61BEF0D-F0BB-DE4B-95CE-6DB70DBA9567}" type="datetimeFigureOut">
               <a:rPr lang="en-US" dirty="0"/>
               <a:pPr/>
-              <a:t>3/13/18</a:t>
+              <a:t>3/19/2018</a:t>
             </a:fld>
             <a:endParaRPr lang="en-US" dirty="0"/>
           </a:p>
@@ -4023,7 +4032,7 @@
             <a:fld id="{B61BEF0D-F0BB-DE4B-95CE-6DB70DBA9567}" type="datetimeFigureOut">
               <a:rPr lang="en-US" dirty="0"/>
               <a:pPr/>
-              <a:t>3/13/18</a:t>
+              <a:t>3/19/2018</a:t>
             </a:fld>
             <a:endParaRPr lang="en-US" dirty="0"/>
           </a:p>
@@ -4334,7 +4343,7 @@
             <a:fld id="{B61BEF0D-F0BB-DE4B-95CE-6DB70DBA9567}" type="datetimeFigureOut">
               <a:rPr lang="en-US" dirty="0"/>
               <a:pPr/>
-              <a:t>3/13/18</a:t>
+              <a:t>3/19/2018</a:t>
             </a:fld>
             <a:endParaRPr lang="en-US" dirty="0"/>
           </a:p>
@@ -4672,7 +4681,7 @@
             <a:fld id="{B61BEF0D-F0BB-DE4B-95CE-6DB70DBA9567}" type="datetimeFigureOut">
               <a:rPr lang="en-US" dirty="0"/>
               <a:pPr/>
-              <a:t>3/13/18</a:t>
+              <a:t>3/19/2018</a:t>
             </a:fld>
             <a:endParaRPr lang="en-US" dirty="0"/>
           </a:p>
@@ -4983,7 +4992,7 @@
             <a:fld id="{B61BEF0D-F0BB-DE4B-95CE-6DB70DBA9567}" type="datetimeFigureOut">
               <a:rPr lang="en-US" dirty="0"/>
               <a:pPr/>
-              <a:t>3/13/18</a:t>
+              <a:t>3/19/2018</a:t>
             </a:fld>
             <a:endParaRPr lang="en-US" dirty="0"/>
           </a:p>
@@ -5373,7 +5382,7 @@
             <a:fld id="{B61BEF0D-F0BB-DE4B-95CE-6DB70DBA9567}" type="datetimeFigureOut">
               <a:rPr lang="en-US" dirty="0"/>
               <a:pPr/>
-              <a:t>3/13/18</a:t>
+              <a:t>3/19/2018</a:t>
             </a:fld>
             <a:endParaRPr lang="en-US" dirty="0"/>
           </a:p>
@@ -5539,7 +5548,7 @@
           <a:p>
             <a:fld id="{55C6B4A9-1611-4792-9094-5F34BCA07E0B}" type="datetimeFigureOut">
               <a:rPr lang="en-US" dirty="0"/>
-              <a:t>3/13/18</a:t>
+              <a:t>3/19/2018</a:t>
             </a:fld>
             <a:endParaRPr lang="en-US" dirty="0"/>
           </a:p>
@@ -5715,7 +5724,7 @@
             <a:fld id="{B61BEF0D-F0BB-DE4B-95CE-6DB70DBA9567}" type="datetimeFigureOut">
               <a:rPr lang="en-US" dirty="0"/>
               <a:pPr/>
-              <a:t>3/13/18</a:t>
+              <a:t>3/19/2018</a:t>
             </a:fld>
             <a:endParaRPr lang="en-US" dirty="0"/>
           </a:p>
@@ -5888,7 +5897,7 @@
             <a:fld id="{B61BEF0D-F0BB-DE4B-95CE-6DB70DBA9567}" type="datetimeFigureOut">
               <a:rPr lang="en-US" dirty="0"/>
               <a:pPr/>
-              <a:t>3/13/18</a:t>
+              <a:t>3/19/2018</a:t>
             </a:fld>
             <a:endParaRPr lang="en-US" dirty="0"/>
           </a:p>
@@ -6132,7 +6141,7 @@
             <a:fld id="{B61BEF0D-F0BB-DE4B-95CE-6DB70DBA9567}" type="datetimeFigureOut">
               <a:rPr lang="en-US" dirty="0"/>
               <a:pPr/>
-              <a:t>3/13/18</a:t>
+              <a:t>3/19/2018</a:t>
             </a:fld>
             <a:endParaRPr lang="en-US" dirty="0"/>
           </a:p>
@@ -6360,7 +6369,7 @@
           <a:p>
             <a:fld id="{EB712588-04B1-427B-82EE-E8DB90309F08}" type="datetimeFigureOut">
               <a:rPr lang="en-US" dirty="0"/>
-              <a:t>3/13/18</a:t>
+              <a:t>3/19/2018</a:t>
             </a:fld>
             <a:endParaRPr lang="en-US" dirty="0"/>
           </a:p>
@@ -6730,7 +6739,7 @@
             <a:fld id="{B61BEF0D-F0BB-DE4B-95CE-6DB70DBA9567}" type="datetimeFigureOut">
               <a:rPr lang="en-US" dirty="0"/>
               <a:pPr/>
-              <a:t>3/13/18</a:t>
+              <a:t>3/19/2018</a:t>
             </a:fld>
             <a:endParaRPr lang="en-US" dirty="0"/>
           </a:p>
@@ -6850,7 +6859,7 @@
             <a:fld id="{B61BEF0D-F0BB-DE4B-95CE-6DB70DBA9567}" type="datetimeFigureOut">
               <a:rPr lang="en-US" dirty="0"/>
               <a:pPr/>
-              <a:t>3/13/18</a:t>
+              <a:t>3/19/2018</a:t>
             </a:fld>
             <a:endParaRPr lang="en-US" dirty="0"/>
           </a:p>
@@ -6942,7 +6951,7 @@
             <a:fld id="{B61BEF0D-F0BB-DE4B-95CE-6DB70DBA9567}" type="datetimeFigureOut">
               <a:rPr lang="en-US" dirty="0"/>
               <a:pPr/>
-              <a:t>3/13/18</a:t>
+              <a:t>3/19/2018</a:t>
             </a:fld>
             <a:endParaRPr lang="en-US" dirty="0"/>
           </a:p>
@@ -7193,7 +7202,7 @@
           <a:p>
             <a:fld id="{42A54C80-263E-416B-A8E0-580EDEADCBDC}" type="datetimeFigureOut">
               <a:rPr lang="en-US" dirty="0"/>
-              <a:t>3/13/18</a:t>
+              <a:t>3/19/2018</a:t>
             </a:fld>
             <a:endParaRPr lang="en-US" dirty="0"/>
           </a:p>
@@ -7452,7 +7461,7 @@
             <a:fld id="{B61BEF0D-F0BB-DE4B-95CE-6DB70DBA9567}" type="datetimeFigureOut">
               <a:rPr lang="en-US" dirty="0"/>
               <a:pPr/>
-              <a:t>3/13/18</a:t>
+              <a:t>3/19/2018</a:t>
             </a:fld>
             <a:endParaRPr lang="en-US" dirty="0"/>
           </a:p>
@@ -8192,7 +8201,7 @@
             <a:fld id="{B61BEF0D-F0BB-DE4B-95CE-6DB70DBA9567}" type="datetimeFigureOut">
               <a:rPr lang="en-US" dirty="0"/>
               <a:pPr/>
-              <a:t>3/13/18</a:t>
+              <a:t>3/19/2018</a:t>
             </a:fld>
             <a:endParaRPr lang="en-US" dirty="0"/>
           </a:p>
@@ -9079,6 +9088,12 @@
           <a:p>
             <a:r>
               <a:rPr lang="en-US" dirty="0"/>
+              <a:t>Reading of Data will be done in batches, to simulate real-time scenario.</a:t>
+            </a:r>
+          </a:p>
+          <a:p>
+            <a:r>
+              <a:rPr lang="en-US" dirty="0"/>
               <a:t>For an ecommerce platform, Real-time dashboard will be created to see how the sales go on a particular day across different locations.</a:t>
             </a:r>
           </a:p>
@@ -9173,7 +9188,12 @@
             <p:ph idx="1"/>
           </p:nvPr>
         </p:nvSpPr>
-        <p:spPr/>
+        <p:spPr>
+          <a:xfrm>
+            <a:off x="677332" y="1755235"/>
+            <a:ext cx="9041703" cy="4485309"/>
+          </a:xfrm>
+        </p:spPr>
         <p:txBody>
           <a:bodyPr>
             <a:normAutofit/>
@@ -9231,7 +9251,15 @@
             </a:pPr>
             <a:r>
               <a:rPr lang="en-US" dirty="0"/>
-              <a:t>Employee can see real-time dashboard</a:t>
+              <a:t>Employee can see overview of the sales of products(</a:t>
+            </a:r>
+            <a:r>
+              <a:rPr lang="en-US" dirty="0" err="1"/>
+              <a:t>eg</a:t>
+            </a:r>
+            <a:r>
+              <a:rPr lang="en-US" dirty="0"/>
+              <a:t>: highest selling Product) on the dashboard homepage</a:t>
             </a:r>
           </a:p>
           <a:p>
@@ -9241,7 +9269,7 @@
             </a:pPr>
             <a:r>
               <a:rPr lang="en-US" dirty="0"/>
-              <a:t>Employee inputs query (such as location, products) and gets the query specific real-time values.</a:t>
+              <a:t>Employee inputs query (such as location, product number) and gets the query specific real-time values.</a:t>
             </a:r>
           </a:p>
           <a:p>
@@ -9251,7 +9279,7 @@
             </a:pPr>
             <a:r>
               <a:rPr lang="en-US" dirty="0"/>
-              <a:t>End user can see the recommended products on their dashboard. (</a:t>
+              <a:t>On the End-users’ dashboard, users will be able to see the recommendations of products based the historical purchases they have made. (</a:t>
             </a:r>
             <a:r>
               <a:rPr lang="en-US" dirty="0">
@@ -10108,14 +10136,14 @@
             <p:ph idx="1"/>
             <p:extLst>
               <p:ext uri="{D42A27DB-BD31-4B8C-83A1-F6EECF244321}">
-                <p14:modId xmlns:p14="http://schemas.microsoft.com/office/powerpoint/2010/main" val="762311186"/>
+                <p14:modId xmlns:p14="http://schemas.microsoft.com/office/powerpoint/2010/main" val="3271518666"/>
               </p:ext>
             </p:extLst>
           </p:nvPr>
         </p:nvGraphicFramePr>
         <p:xfrm>
           <a:off x="677863" y="2160588"/>
-          <a:ext cx="10406148" cy="3881865"/>
+          <a:ext cx="10406148" cy="4295946"/>
         </p:xfrm>
         <a:graphic>
           <a:graphicData uri="http://schemas.openxmlformats.org/drawingml/2006/table">
@@ -10250,6 +10278,16 @@
                         <a:t>Integrating Kafka and Spark Streaming</a:t>
                       </a:r>
                     </a:p>
+                    <a:p>
+                      <a:pPr marL="285750" indent="-285750">
+                        <a:buFont typeface="Arial" panose="020B0604020202020204" pitchFamily="34" charset="0"/>
+                        <a:buChar char="•"/>
+                      </a:pPr>
+                      <a:r>
+                        <a:rPr lang="en-US" dirty="0"/>
+                        <a:t>Unit Testing</a:t>
+                      </a:r>
+                    </a:p>
                   </a:txBody>
                   <a:tcPr/>
                 </a:tc>
@@ -10321,6 +10359,16 @@
                       <a:r>
                         <a:rPr lang="en-US" dirty="0"/>
                         <a:t>Initial setup for UI</a:t>
+                      </a:r>
+                    </a:p>
+                    <a:p>
+                      <a:pPr marL="285750" indent="-285750">
+                        <a:buFont typeface="Arial" panose="020B0604020202020204" pitchFamily="34" charset="0"/>
+                        <a:buChar char="•"/>
+                      </a:pPr>
+                      <a:r>
+                        <a:rPr lang="en-US" dirty="0"/>
+                        <a:t>Unit Testing</a:t>
                       </a:r>
                     </a:p>
                   </a:txBody>
@@ -10406,6 +10454,16 @@
                       <a:r>
                         <a:rPr lang="en-US" dirty="0"/>
                         <a:t>)</a:t>
+                      </a:r>
+                    </a:p>
+                    <a:p>
+                      <a:pPr marL="285750" indent="-285750">
+                        <a:buFont typeface="Arial" panose="020B0604020202020204" pitchFamily="34" charset="0"/>
+                        <a:buChar char="•"/>
+                      </a:pPr>
+                      <a:r>
+                        <a:rPr lang="en-US" dirty="0"/>
+                        <a:t>Unit and Integration Testing</a:t>
                       </a:r>
                     </a:p>
                   </a:txBody>
@@ -10791,19 +10849,13 @@
           <a:p>
             <a:r>
               <a:rPr lang="en-US" dirty="0"/>
-              <a:t>Kafka will read the data in batches</a:t>
+              <a:t>85% of the time, Spark Streaming will clean the data received, process it and generate/update the dashboard within 10 sec</a:t>
             </a:r>
           </a:p>
           <a:p>
             <a:r>
               <a:rPr lang="en-US" dirty="0"/>
-              <a:t>The Spark Streaming will clean the data received, process it and generate/update the dashboard within 9-10 sec</a:t>
-            </a:r>
-          </a:p>
-          <a:p>
-            <a:r>
-              <a:rPr lang="en-US" dirty="0"/>
-              <a:t>Proposed accuracy for ML model 61% (optional)</a:t>
+              <a:t>Proposed accuracy for ML model greater than 61% (optional)</a:t>
             </a:r>
           </a:p>
         </p:txBody>

</xml_diff>